<commit_message>
add'l preso content, added ESG Research doc
</commit_message>
<xml_diff>
--- a/SWC2024-LunchPreso/ProtectYourPython.pptx
+++ b/SWC2024-LunchPreso/ProtectYourPython.pptx
@@ -610,7 +610,7 @@
           <a:p>
             <a:fld id="{9D8A2B0D-E315-41D0-B099-3ED602A8C128}" type="datetimeFigureOut">
               <a:rPr lang="en-US" smtClean="0"/>
-              <a:t>7/2/2024</a:t>
+              <a:t>7/3/2024</a:t>
             </a:fld>
             <a:endParaRPr lang="en-US"/>
           </a:p>
@@ -1957,7 +1957,7 @@
           <a:p>
             <a:fld id="{9D8A2B0D-E315-41D0-B099-3ED602A8C128}" type="datetimeFigureOut">
               <a:rPr lang="en-US" smtClean="0"/>
-              <a:t>7/2/2024</a:t>
+              <a:t>7/3/2024</a:t>
             </a:fld>
             <a:endParaRPr lang="en-US"/>
           </a:p>
@@ -2959,14 +2959,117 @@
         </p:nvSpPr>
         <p:spPr>
           <a:xfrm>
-            <a:off x="838200" y="1195755"/>
-            <a:ext cx="10515600" cy="4653508"/>
-          </a:xfrm>
-        </p:spPr>
-        <p:txBody>
-          <a:bodyPr/>
+            <a:off x="838200" y="1195754"/>
+            <a:ext cx="10515600" cy="4824045"/>
+          </a:xfrm>
+        </p:spPr>
+        <p:txBody>
+          <a:bodyPr>
+            <a:normAutofit fontScale="92500" lnSpcReduction="10000"/>
+          </a:bodyPr>
           <a:lstStyle/>
           <a:p>
+            <a:r>
+              <a:rPr lang="en-US" sz="2600"/>
+              <a:t>Vulnerabilities can occur in any programming language</a:t>
+            </a:r>
+          </a:p>
+          <a:p>
+            <a:pPr>
+              <a:lnSpc>
+                <a:spcPct val="120000"/>
+              </a:lnSpc>
+            </a:pPr>
+            <a:r>
+              <a:rPr lang="en-US" sz="2600"/>
+              <a:t>Python is a great example because it is  so widely used, especially in data science </a:t>
+            </a:r>
+          </a:p>
+          <a:p>
+            <a:pPr lvl="1">
+              <a:lnSpc>
+                <a:spcPct val="120000"/>
+              </a:lnSpc>
+            </a:pPr>
+            <a:r>
+              <a:rPr lang="en-US" sz="2200"/>
+              <a:t>People of all skill levels are using it, so risks are more pronounced</a:t>
+            </a:r>
+          </a:p>
+          <a:p>
+            <a:r>
+              <a:rPr lang="en-US" sz="2600"/>
+              <a:t>Examples of recently reported vulnerabilities in open source Python tools:</a:t>
+            </a:r>
+          </a:p>
+          <a:p>
+            <a:pPr marL="457200" indent="0">
+              <a:buNone/>
+            </a:pPr>
+            <a:r>
+              <a:rPr lang="en-US" sz="2600">
+                <a:hlinkClick r:id="rId2"/>
+              </a:rPr>
+              <a:t>https://thehackernews.com/2024/02/new-malicious-pypi-packages-caught.html</a:t>
+            </a:r>
+            <a:endParaRPr lang="en-US" sz="2600"/>
+          </a:p>
+          <a:p>
+            <a:pPr marL="914400" lvl="1" indent="0">
+              <a:buNone/>
+            </a:pPr>
+            <a:r>
+              <a:rPr lang="en-US" b="1"/>
+              <a:t>New Malicious PyPI Packages Caught Using Covert Side-Loading Tactics</a:t>
+            </a:r>
+          </a:p>
+          <a:p>
+            <a:pPr marL="457200" indent="0">
+              <a:buNone/>
+            </a:pPr>
+            <a:r>
+              <a:rPr lang="en-US" sz="2600">
+                <a:hlinkClick r:id="rId3"/>
+              </a:rPr>
+              <a:t>https://www.sonatype.com/blog/top-8-malicious-attacks-recently-found-on-pypi </a:t>
+            </a:r>
+            <a:endParaRPr lang="en-US" sz="2600"/>
+          </a:p>
+          <a:p>
+            <a:pPr marL="914400" lvl="2" indent="0">
+              <a:buNone/>
+            </a:pPr>
+            <a:r>
+              <a:rPr lang="en-US" sz="2300" b="1"/>
+              <a:t>RAT (Remote Access Trojan) Mutants</a:t>
+            </a:r>
+          </a:p>
+          <a:p>
+            <a:pPr marL="914400" lvl="2" indent="0">
+              <a:buNone/>
+            </a:pPr>
+            <a:r>
+              <a:rPr lang="en-US" sz="2300" b="1"/>
+              <a:t>PyTorch Namespace Confusion Attack</a:t>
+            </a:r>
+          </a:p>
+          <a:p>
+            <a:pPr marL="914400" lvl="2" indent="0">
+              <a:buNone/>
+            </a:pPr>
+            <a:r>
+              <a:rPr lang="en-US" sz="2300" b="1"/>
+              <a:t>GTA 5 Multihack Site</a:t>
+            </a:r>
+            <a:r>
+              <a:rPr lang="en-US" sz="2600"/>
+              <a:t> </a:t>
+            </a:r>
+          </a:p>
+          <a:p>
+            <a:pPr marL="457200" lvl="1" indent="0">
+              <a:buNone/>
+            </a:pPr>
             <a:endParaRPr lang="en-US"/>
           </a:p>
         </p:txBody>
@@ -3060,9 +3163,97 @@
           </a:xfrm>
         </p:spPr>
         <p:txBody>
-          <a:bodyPr/>
+          <a:bodyPr>
+            <a:normAutofit fontScale="92500"/>
+          </a:bodyPr>
           <a:lstStyle/>
           <a:p>
+            <a:r>
+              <a:rPr lang="en-US"/>
+              <a:t>A </a:t>
+            </a:r>
+            <a:r>
+              <a:rPr lang="en-US" b="1"/>
+              <a:t>Software Bill of Materials (SBOM) </a:t>
+            </a:r>
+            <a:r>
+              <a:rPr lang="en-US"/>
+              <a:t>is a detailed inventory of all components, libraries, and dependencies used by a software application</a:t>
+            </a:r>
+          </a:p>
+          <a:p>
+            <a:r>
+              <a:rPr lang="en-US"/>
+              <a:t>It provides a comprehensive record which lists open-source, proprietary, and third-party components</a:t>
+            </a:r>
+          </a:p>
+          <a:p>
+            <a:r>
+              <a:rPr lang="en-US"/>
+              <a:t>It contains component metadata, including version numbers, licenses, and source information</a:t>
+            </a:r>
+          </a:p>
+          <a:p>
+            <a:r>
+              <a:rPr lang="en-US"/>
+              <a:t>SBOMs promote visibility into the software supply chain</a:t>
+            </a:r>
+          </a:p>
+          <a:p>
+            <a:r>
+              <a:rPr lang="en-US"/>
+              <a:t>Used in conjunction with scanning tools to identify components with known security issues</a:t>
+            </a:r>
+          </a:p>
+          <a:p>
+            <a:r>
+              <a:rPr lang="en-US"/>
+              <a:t>Popular SBOM generators include </a:t>
+            </a:r>
+            <a:r>
+              <a:rPr lang="en-US" b="1"/>
+              <a:t>CycloneDX</a:t>
+            </a:r>
+            <a:r>
+              <a:rPr lang="en-US"/>
+              <a:t>, </a:t>
+            </a:r>
+            <a:r>
+              <a:rPr lang="en-US" b="1"/>
+              <a:t>SPDX</a:t>
+            </a:r>
+            <a:r>
+              <a:rPr lang="en-US"/>
+              <a:t>, </a:t>
+            </a:r>
+            <a:r>
+              <a:rPr lang="en-US" b="1"/>
+              <a:t>OWASP Dependency-Track</a:t>
+            </a:r>
+            <a:r>
+              <a:rPr lang="en-US"/>
+              <a:t>, </a:t>
+            </a:r>
+            <a:r>
+              <a:rPr lang="en-US" b="1"/>
+              <a:t>Syft</a:t>
+            </a:r>
+            <a:r>
+              <a:rPr lang="en-US"/>
+              <a:t>, </a:t>
+            </a:r>
+            <a:r>
+              <a:rPr lang="en-US" b="1"/>
+              <a:t>Anchore</a:t>
+            </a:r>
+            <a:r>
+              <a:rPr lang="en-US"/>
+              <a:t>, and </a:t>
+            </a:r>
+            <a:r>
+              <a:rPr lang="en-US" b="1"/>
+              <a:t>FOSSA</a:t>
+            </a:r>
             <a:endParaRPr lang="en-US"/>
           </a:p>
         </p:txBody>
@@ -3156,9 +3347,91 @@
           </a:xfrm>
         </p:spPr>
         <p:txBody>
-          <a:bodyPr/>
+          <a:bodyPr>
+            <a:normAutofit/>
+          </a:bodyPr>
           <a:lstStyle/>
           <a:p>
+            <a:r>
+              <a:rPr lang="en-US"/>
+              <a:t>Open source scanning tools scan software codebases to identify open-source components and their licenses</a:t>
+            </a:r>
+          </a:p>
+          <a:p>
+            <a:r>
+              <a:rPr lang="en-US"/>
+              <a:t>The tools find known vulnerabilities in open-source libraries and dependencies</a:t>
+            </a:r>
+          </a:p>
+          <a:p>
+            <a:r>
+              <a:rPr lang="en-US"/>
+              <a:t>They ensures compliance with open-source licenses and legal requirements</a:t>
+            </a:r>
+          </a:p>
+          <a:p>
+            <a:r>
+              <a:rPr lang="en-US"/>
+              <a:t>The tools assess and manage potential risks associated with using open-source software</a:t>
+            </a:r>
+          </a:p>
+          <a:p>
+            <a:r>
+              <a:rPr lang="en-US"/>
+              <a:t>Popular scanning tools include </a:t>
+            </a:r>
+            <a:r>
+              <a:rPr lang="en-US" b="1"/>
+              <a:t>Sonatype Nexus IQ</a:t>
+            </a:r>
+            <a:r>
+              <a:rPr lang="en-US"/>
+              <a:t>, </a:t>
+            </a:r>
+            <a:r>
+              <a:rPr lang="en-US" b="1"/>
+              <a:t>Snyk</a:t>
+            </a:r>
+            <a:r>
+              <a:rPr lang="en-US"/>
+              <a:t>, </a:t>
+            </a:r>
+            <a:r>
+              <a:rPr lang="en-US" b="1"/>
+              <a:t>Black Duck</a:t>
+            </a:r>
+            <a:r>
+              <a:rPr lang="en-US"/>
+              <a:t>, </a:t>
+            </a:r>
+            <a:r>
+              <a:rPr lang="en-US" b="1"/>
+              <a:t>OWASP Dependency-Check</a:t>
+            </a:r>
+            <a:r>
+              <a:rPr lang="en-US"/>
+              <a:t>, </a:t>
+            </a:r>
+            <a:r>
+              <a:rPr lang="en-US" b="1"/>
+              <a:t>WhiteSource</a:t>
+            </a:r>
+            <a:r>
+              <a:rPr lang="en-US"/>
+              <a:t>, </a:t>
+            </a:r>
+            <a:r>
+              <a:rPr lang="en-US" b="1"/>
+              <a:t>Trivy</a:t>
+            </a:r>
+            <a:r>
+              <a:rPr lang="en-US"/>
+              <a:t>, and </a:t>
+            </a:r>
+            <a:r>
+              <a:rPr lang="en-US" b="1"/>
+              <a:t>Clair</a:t>
+            </a:r>
             <a:endParaRPr lang="en-US"/>
           </a:p>
         </p:txBody>
@@ -3252,10 +3525,55 @@
           </a:xfrm>
         </p:spPr>
         <p:txBody>
-          <a:bodyPr/>
+          <a:bodyPr>
+            <a:normAutofit/>
+          </a:bodyPr>
           <a:lstStyle/>
           <a:p>
-            <a:endParaRPr lang="en-US"/>
+            <a:r>
+              <a:rPr lang="en-US"/>
+              <a:t>Create the project SBOM (includes components, dependencies, and  metadata)</a:t>
+            </a:r>
+          </a:p>
+          <a:p>
+            <a:r>
+              <a:rPr lang="en-US"/>
+              <a:t>Configure the scanner to use the generated SBOM</a:t>
+            </a:r>
+          </a:p>
+          <a:p>
+            <a:r>
+              <a:rPr lang="en-US"/>
+              <a:t>The scanner cross-references SBOM data with vulnerability databases </a:t>
+            </a:r>
+          </a:p>
+          <a:p>
+            <a:pPr marL="914400" indent="0">
+              <a:buNone/>
+            </a:pPr>
+            <a:r>
+              <a:rPr lang="en-US" sz="2400"/>
+              <a:t>e.g., </a:t>
+            </a:r>
+            <a:r>
+              <a:rPr lang="en-US" sz="2400" b="1"/>
+              <a:t>National Vulnerability Database (NVD), Common Vulnerabilities and Exposures (CVE), OSS Index, GitHub Advisory Database, Snyk Vulnerability Database </a:t>
+            </a:r>
+          </a:p>
+          <a:p>
+            <a:pPr indent="0">
+              <a:buNone/>
+            </a:pPr>
+            <a:r>
+              <a:rPr lang="en-US"/>
+              <a:t>to identify known issues</a:t>
+            </a:r>
+          </a:p>
+          <a:p>
+            <a:r>
+              <a:rPr lang="en-US"/>
+              <a:t>A detailed report is generated highlighting vulnerabilities and providing actionable insights for remediation and updates.</a:t>
+            </a:r>
           </a:p>
         </p:txBody>
       </p:sp>
@@ -3348,8 +3666,52 @@
           </a:xfrm>
         </p:spPr>
         <p:txBody>
-          <a:bodyPr/>
+          <a:bodyPr>
+            <a:normAutofit/>
+          </a:bodyPr>
           <a:lstStyle/>
+          <a:p>
+            <a:r>
+              <a:rPr lang="en-US"/>
+              <a:t>The following example demonstrates how to perform a scan.</a:t>
+            </a:r>
+          </a:p>
+          <a:p>
+            <a:r>
+              <a:rPr lang="en-US"/>
+              <a:t>Scenario: You are developing a machine learning model using TensorFlow, a widely-used open source machine learning library.</a:t>
+            </a:r>
+          </a:p>
+          <a:p>
+            <a:pPr marL="914400" indent="-288925">
+              <a:buFont typeface="+mj-lt"/>
+              <a:buAutoNum type="arabicPeriod"/>
+            </a:pPr>
+            <a:r>
+              <a:rPr lang="en-US"/>
+              <a:t>Run the scanning tool to identify known vulnerabilities in the TensorFlow library and its dependencies.</a:t>
+            </a:r>
+          </a:p>
+          <a:p>
+            <a:pPr marL="914400" indent="-288925">
+              <a:buFont typeface="+mj-lt"/>
+              <a:buAutoNum type="arabicPeriod"/>
+            </a:pPr>
+            <a:r>
+              <a:rPr lang="en-US"/>
+              <a:t>The scan detects critical vulnerabilities in specific versions of TensorFlow and dependencies that could allow remote code execution.</a:t>
+            </a:r>
+          </a:p>
+          <a:p>
+            <a:pPr marL="914400" indent="-288925">
+              <a:buFont typeface="+mj-lt"/>
+              <a:buAutoNum type="arabicPeriod"/>
+            </a:pPr>
+            <a:r>
+              <a:rPr lang="en-US"/>
+              <a:t>Based on the scan results, update TensorFlow to a version where the vulnerability is patched.</a:t>
+            </a:r>
+          </a:p>
           <a:p>
             <a:endParaRPr lang="en-US"/>
           </a:p>
@@ -3444,9 +3806,50 @@
           </a:xfrm>
         </p:spPr>
         <p:txBody>
-          <a:bodyPr/>
+          <a:bodyPr>
+            <a:normAutofit/>
+          </a:bodyPr>
           <a:lstStyle/>
           <a:p>
+            <a:r>
+              <a:rPr lang="en-US" sz="2400"/>
+              <a:t>Additional steps: Implement continuous scanning in your CI/CD pipeline to monitor for new vulnerabilities in dependencies.</a:t>
+            </a:r>
+          </a:p>
+          <a:p>
+            <a:r>
+              <a:rPr lang="en-US" sz="2400"/>
+              <a:t>The scan also checks for licensing issues, ensuring all components comply with your project's license policy.</a:t>
+            </a:r>
+          </a:p>
+          <a:p>
+            <a:pPr marL="228600" lvl="2">
+              <a:lnSpc>
+                <a:spcPct val="120000"/>
+              </a:lnSpc>
+            </a:pPr>
+            <a:r>
+              <a:rPr lang="en-US" sz="2400"/>
+              <a:t>Active community maintenance efforts help in promptly addressing vulnerabilities, but the risk is still non-zero. </a:t>
+            </a:r>
+          </a:p>
+          <a:p>
+            <a:pPr marL="228600" lvl="2">
+              <a:lnSpc>
+                <a:spcPct val="120000"/>
+              </a:lnSpc>
+            </a:pPr>
+            <a:r>
+              <a:rPr lang="en-US" sz="2400"/>
+              <a:t>To mitigate risks, it is essential to use latest versions, apply security patches, and perform regular vulnerability scans</a:t>
+            </a:r>
+          </a:p>
+          <a:p>
+            <a:pPr marL="228600" lvl="2">
+              <a:lnSpc>
+                <a:spcPct val="120000"/>
+              </a:lnSpc>
+            </a:pPr>
             <a:endParaRPr lang="en-US"/>
           </a:p>
         </p:txBody>

</xml_diff>